<commit_message>
code for making important figures added
</commit_message>
<xml_diff>
--- a/PresentationSlides.pptx
+++ b/PresentationSlides.pptx
@@ -2603,6 +2603,85 @@
           <a:chExt cx="0" cy="0"/>
         </a:xfrm>
       </p:grpSpPr>
+      <p:grpSp>
+        <p:nvGrpSpPr>
+          <p:cNvPr id="6" name="Group 5" descr="catterplot of two Nyan Nyan cats flying toward one another with rainbows trailing behind">
+            <a:extLst>
+              <a:ext uri="{FF2B5EF4-FFF2-40B4-BE49-F238E27FC236}">
+                <a16:creationId xmlns:a16="http://schemas.microsoft.com/office/drawing/2014/main" id="{A149D828-94A2-BF41-88D9-0DB9D8E2083A}"/>
+              </a:ext>
+            </a:extLst>
+          </p:cNvPr>
+          <p:cNvGrpSpPr/>
+          <p:nvPr/>
+        </p:nvGrpSpPr>
+        <p:grpSpPr>
+          <a:xfrm>
+            <a:off x="184429" y="170687"/>
+            <a:ext cx="8691940" cy="2483303"/>
+            <a:chOff x="184429" y="170687"/>
+            <a:chExt cx="8691940" cy="2483303"/>
+          </a:xfrm>
+        </p:grpSpPr>
+        <p:pic>
+          <p:nvPicPr>
+            <p:cNvPr id="5" name="Picture 4">
+              <a:extLst>
+                <a:ext uri="{FF2B5EF4-FFF2-40B4-BE49-F238E27FC236}">
+                  <a16:creationId xmlns:a16="http://schemas.microsoft.com/office/drawing/2014/main" id="{F319E43E-F700-8344-85BB-DA9BC04D749A}"/>
+                </a:ext>
+              </a:extLst>
+            </p:cNvPr>
+            <p:cNvPicPr>
+              <a:picLocks noChangeAspect="1"/>
+            </p:cNvPicPr>
+            <p:nvPr/>
+          </p:nvPicPr>
+          <p:blipFill rotWithShape="1">
+            <a:blip r:embed="rId2"/>
+            <a:srcRect t="15775" r="6574" b="11976"/>
+            <a:stretch/>
+          </p:blipFill>
+          <p:spPr>
+            <a:xfrm flipH="1">
+              <a:off x="4519446" y="170687"/>
+              <a:ext cx="4356923" cy="2483303"/>
+            </a:xfrm>
+            <a:prstGeom prst="rect">
+              <a:avLst/>
+            </a:prstGeom>
+          </p:spPr>
+        </p:pic>
+        <p:pic>
+          <p:nvPicPr>
+            <p:cNvPr id="4" name="Picture 3">
+              <a:extLst>
+                <a:ext uri="{FF2B5EF4-FFF2-40B4-BE49-F238E27FC236}">
+                  <a16:creationId xmlns:a16="http://schemas.microsoft.com/office/drawing/2014/main" id="{3AECE707-085B-9E47-BB7A-A6555FBF44F7}"/>
+                </a:ext>
+              </a:extLst>
+            </p:cNvPr>
+            <p:cNvPicPr>
+              <a:picLocks noChangeAspect="1"/>
+            </p:cNvPicPr>
+            <p:nvPr/>
+          </p:nvPicPr>
+          <p:blipFill rotWithShape="1">
+            <a:blip r:embed="rId2"/>
+            <a:srcRect l="1" t="15775" r="6955" b="11907"/>
+            <a:stretch/>
+          </p:blipFill>
+          <p:spPr>
+            <a:xfrm>
+              <a:off x="184429" y="170688"/>
+              <a:ext cx="4335019" cy="2483302"/>
+            </a:xfrm>
+            <a:prstGeom prst="rect">
+              <a:avLst/>
+            </a:prstGeom>
+          </p:spPr>
+        </p:pic>
+      </p:grpSp>
       <p:sp>
         <p:nvSpPr>
           <p:cNvPr id="2" name="Title 1">
@@ -2619,7 +2698,12 @@
             <p:ph type="ctrTitle"/>
           </p:nvPr>
         </p:nvSpPr>
-        <p:spPr/>
+        <p:spPr>
+          <a:xfrm>
+            <a:off x="1143000" y="1600053"/>
+            <a:ext cx="6858000" cy="1790700"/>
+          </a:xfrm>
+        </p:spPr>
         <p:txBody>
           <a:bodyPr/>
           <a:lstStyle/>
@@ -2649,8 +2733,8 @@
         </p:nvSpPr>
         <p:spPr>
           <a:xfrm>
-            <a:off x="150829" y="2701527"/>
-            <a:ext cx="8842342" cy="2021301"/>
+            <a:off x="150829" y="3459808"/>
+            <a:ext cx="8842342" cy="1528503"/>
           </a:xfrm>
         </p:spPr>
         <p:txBody>
@@ -2674,7 +2758,7 @@
           <a:p>
             <a:r>
               <a:rPr lang="en-US" sz="2800" dirty="0">
-                <a:hlinkClick r:id="rId2"/>
+                <a:hlinkClick r:id="rId3"/>
               </a:rPr>
               <a:t>https://github.com/flaxmans/Building_IBMs_demo</a:t>
             </a:r>
@@ -3363,6 +3447,85 @@
           </a:p>
         </p:txBody>
       </p:sp>
+      <p:grpSp>
+        <p:nvGrpSpPr>
+          <p:cNvPr id="10" name="Group 9" descr="catterplot of two Nyan Nyan cats flying toward one another with rainbows trailing behind">
+            <a:extLst>
+              <a:ext uri="{FF2B5EF4-FFF2-40B4-BE49-F238E27FC236}">
+                <a16:creationId xmlns:a16="http://schemas.microsoft.com/office/drawing/2014/main" id="{174531ED-2F21-934F-9914-E5CCFDB460A1}"/>
+              </a:ext>
+            </a:extLst>
+          </p:cNvPr>
+          <p:cNvGrpSpPr/>
+          <p:nvPr/>
+        </p:nvGrpSpPr>
+        <p:grpSpPr>
+          <a:xfrm>
+            <a:off x="184429" y="170687"/>
+            <a:ext cx="8691940" cy="2483303"/>
+            <a:chOff x="184429" y="170687"/>
+            <a:chExt cx="8691940" cy="2483303"/>
+          </a:xfrm>
+        </p:grpSpPr>
+        <p:pic>
+          <p:nvPicPr>
+            <p:cNvPr id="11" name="Picture 10">
+              <a:extLst>
+                <a:ext uri="{FF2B5EF4-FFF2-40B4-BE49-F238E27FC236}">
+                  <a16:creationId xmlns:a16="http://schemas.microsoft.com/office/drawing/2014/main" id="{E3F80384-767C-3148-BFFA-BCDB8D14338D}"/>
+                </a:ext>
+              </a:extLst>
+            </p:cNvPr>
+            <p:cNvPicPr>
+              <a:picLocks noChangeAspect="1"/>
+            </p:cNvPicPr>
+            <p:nvPr/>
+          </p:nvPicPr>
+          <p:blipFill rotWithShape="1">
+            <a:blip r:embed="rId2"/>
+            <a:srcRect t="15775" r="6574" b="11976"/>
+            <a:stretch/>
+          </p:blipFill>
+          <p:spPr>
+            <a:xfrm flipH="1">
+              <a:off x="4519446" y="170687"/>
+              <a:ext cx="4356923" cy="2483303"/>
+            </a:xfrm>
+            <a:prstGeom prst="rect">
+              <a:avLst/>
+            </a:prstGeom>
+          </p:spPr>
+        </p:pic>
+        <p:pic>
+          <p:nvPicPr>
+            <p:cNvPr id="12" name="Picture 11">
+              <a:extLst>
+                <a:ext uri="{FF2B5EF4-FFF2-40B4-BE49-F238E27FC236}">
+                  <a16:creationId xmlns:a16="http://schemas.microsoft.com/office/drawing/2014/main" id="{E9F8F59A-DA35-D343-9B10-502B6F11F6C1}"/>
+                </a:ext>
+              </a:extLst>
+            </p:cNvPr>
+            <p:cNvPicPr>
+              <a:picLocks noChangeAspect="1"/>
+            </p:cNvPicPr>
+            <p:nvPr/>
+          </p:nvPicPr>
+          <p:blipFill rotWithShape="1">
+            <a:blip r:embed="rId2"/>
+            <a:srcRect l="1" t="15775" r="6955" b="11907"/>
+            <a:stretch/>
+          </p:blipFill>
+          <p:spPr>
+            <a:xfrm>
+              <a:off x="184429" y="170688"/>
+              <a:ext cx="4335019" cy="2483302"/>
+            </a:xfrm>
+            <a:prstGeom prst="rect">
+              <a:avLst/>
+            </a:prstGeom>
+          </p:spPr>
+        </p:pic>
+      </p:grpSp>
     </p:spTree>
     <p:extLst>
       <p:ext uri="{BB962C8B-B14F-4D97-AF65-F5344CB8AC3E}">
@@ -5878,13 +6041,13 @@
         </p:nvSpPr>
         <p:spPr>
           <a:xfrm>
-            <a:off x="93442" y="707491"/>
-            <a:ext cx="8904350" cy="4147313"/>
+            <a:off x="93441" y="707491"/>
+            <a:ext cx="3935865" cy="4147313"/>
           </a:xfrm>
         </p:spPr>
         <p:txBody>
           <a:bodyPr>
-            <a:normAutofit/>
+            <a:noAutofit/>
           </a:bodyPr>
           <a:lstStyle/>
           <a:p>
@@ -5895,22 +6058,17 @@
               <a:rPr lang="en-US" sz="2400" i="1" dirty="0"/>
               <a:t>(a) Biology</a:t>
             </a:r>
+            <a:endParaRPr lang="en-US" sz="2400" dirty="0"/>
           </a:p>
           <a:p>
             <a:pPr marL="0" indent="0">
               <a:buNone/>
             </a:pPr>
-            <a:endParaRPr lang="en-US" sz="300" dirty="0"/>
-          </a:p>
-          <a:p>
-            <a:pPr marL="0" indent="0">
-              <a:buNone/>
-            </a:pPr>
-            <a:r>
-              <a:rPr lang="en-US" sz="2800" dirty="0"/>
+            <a:r>
+              <a:rPr lang="en-US" sz="2400" dirty="0"/>
               <a:t>Models of neutral evolution frequently assume random reproduction in a population of hermaphroditic organisms.  How can this be implemented in a stochastic individual based model?</a:t>
             </a:r>
-            <a:endParaRPr lang="en-US" sz="2800" dirty="0">
+            <a:endParaRPr lang="en-US" sz="2400" dirty="0">
               <a:latin typeface="Consolas" panose="020B0609020204030204" pitchFamily="49" charset="0"/>
               <a:cs typeface="Consolas" panose="020B0609020204030204" pitchFamily="49" charset="0"/>
             </a:endParaRPr>
@@ -5967,6 +6125,35 @@
           </a:p>
         </p:txBody>
       </p:sp>
+      <p:pic>
+        <p:nvPicPr>
+          <p:cNvPr id="6" name="Picture 5" descr="51 random cats on the unit square">
+            <a:extLst>
+              <a:ext uri="{FF2B5EF4-FFF2-40B4-BE49-F238E27FC236}">
+                <a16:creationId xmlns:a16="http://schemas.microsoft.com/office/drawing/2014/main" id="{7A73CED9-ECA0-E949-8048-E3665AD1794E}"/>
+              </a:ext>
+            </a:extLst>
+          </p:cNvPr>
+          <p:cNvPicPr>
+            <a:picLocks noChangeAspect="1"/>
+          </p:cNvPicPr>
+          <p:nvPr/>
+        </p:nvPicPr>
+        <p:blipFill rotWithShape="1">
+          <a:blip r:embed="rId2"/>
+          <a:srcRect l="981" t="12181" r="5634" b="3080"/>
+          <a:stretch/>
+        </p:blipFill>
+        <p:spPr>
+          <a:xfrm>
+            <a:off x="4029306" y="654096"/>
+            <a:ext cx="4638970" cy="4340612"/>
+          </a:xfrm>
+          <a:prstGeom prst="rect">
+            <a:avLst/>
+          </a:prstGeom>
+        </p:spPr>
+      </p:pic>
     </p:spTree>
     <p:extLst>
       <p:ext uri="{BB962C8B-B14F-4D97-AF65-F5344CB8AC3E}">
@@ -6386,7 +6573,7 @@
         <p:spPr>
           <a:xfrm>
             <a:off x="93442" y="707491"/>
-            <a:ext cx="8904350" cy="4147313"/>
+            <a:ext cx="3846656" cy="4147313"/>
           </a:xfrm>
         </p:spPr>
         <p:txBody>
@@ -6407,14 +6594,14 @@
             <a:pPr marL="0" indent="0">
               <a:buNone/>
             </a:pPr>
-            <a:endParaRPr lang="en-US" sz="300" dirty="0"/>
+            <a:endParaRPr lang="en-US" sz="2400" dirty="0"/>
           </a:p>
           <a:p>
             <a:pPr marL="0" indent="0">
               <a:buNone/>
             </a:pPr>
             <a:r>
-              <a:rPr lang="en-US" sz="2800" dirty="0"/>
+              <a:rPr lang="en-US" sz="2400" dirty="0"/>
               <a:t>For the sake of time, let's assume a constant population size, i.e., fixed number of offspring</a:t>
             </a:r>
           </a:p>
@@ -6422,7 +6609,7 @@
             <a:pPr marL="0" indent="0">
               <a:buNone/>
             </a:pPr>
-            <a:endParaRPr lang="en-US" sz="2800" dirty="0"/>
+            <a:endParaRPr lang="en-US" sz="2400" dirty="0"/>
           </a:p>
           <a:p>
             <a:pPr>
@@ -6430,7 +6617,7 @@
               <a:buChar char="à"/>
             </a:pPr>
             <a:r>
-              <a:rPr lang="en-US" sz="2800" dirty="0">
+              <a:rPr lang="en-US" sz="2400" dirty="0">
                 <a:sym typeface="Wingdings" pitchFamily="2" charset="2"/>
               </a:rPr>
               <a:t> focus on writing an algorithm for getting pairs of parents</a:t>
@@ -6488,6 +6675,35 @@
           </a:p>
         </p:txBody>
       </p:sp>
+      <p:pic>
+        <p:nvPicPr>
+          <p:cNvPr id="6" name="Picture 5" descr="51 random cats on the unit square">
+            <a:extLst>
+              <a:ext uri="{FF2B5EF4-FFF2-40B4-BE49-F238E27FC236}">
+                <a16:creationId xmlns:a16="http://schemas.microsoft.com/office/drawing/2014/main" id="{E8C4F5B2-F6E9-204F-9104-21D01A6CF887}"/>
+              </a:ext>
+            </a:extLst>
+          </p:cNvPr>
+          <p:cNvPicPr>
+            <a:picLocks noChangeAspect="1"/>
+          </p:cNvPicPr>
+          <p:nvPr/>
+        </p:nvPicPr>
+        <p:blipFill rotWithShape="1">
+          <a:blip r:embed="rId2"/>
+          <a:srcRect l="13253" t="12181" r="5634" b="16122"/>
+          <a:stretch/>
+        </p:blipFill>
+        <p:spPr>
+          <a:xfrm>
+            <a:off x="4059468" y="654096"/>
+            <a:ext cx="4608808" cy="4200708"/>
+          </a:xfrm>
+          <a:prstGeom prst="rect">
+            <a:avLst/>
+          </a:prstGeom>
+        </p:spPr>
+      </p:pic>
     </p:spTree>
     <p:extLst>
       <p:ext uri="{BB962C8B-B14F-4D97-AF65-F5344CB8AC3E}">
@@ -7502,13 +7718,13 @@
           <a:p>
             <a:r>
               <a:rPr lang="en-US" sz="2400" dirty="0"/>
-              <a:t>The scripts I provided are blank canvases, for the most part</a:t>
+              <a:t> The scripts I provided are blank canvases, for the most part</a:t>
             </a:r>
           </a:p>
           <a:p>
             <a:r>
               <a:rPr lang="en-US" sz="2400" dirty="0"/>
-              <a:t>Some functions partially coded, some </a:t>
+              <a:t> Some functions partially coded, some </a:t>
             </a:r>
             <a:r>
               <a:rPr lang="en-US" sz="2400" dirty="0" err="1"/>
@@ -7522,7 +7738,7 @@
           <a:p>
             <a:r>
               <a:rPr lang="en-US" sz="2400" dirty="0"/>
-              <a:t>BUT, even now, it can be run, which means that piecewise additions can be debugged!</a:t>
+              <a:t> BUT, even now, it can be run, which means that piecewise additions can be debugged!</a:t>
             </a:r>
           </a:p>
         </p:txBody>

</xml_diff>